<commit_message>
More work on progress update
</commit_message>
<xml_diff>
--- a/Progress 18 Nov 2015/6 - Screens.pptx
+++ b/Progress 18 Nov 2015/6 - Screens.pptx
@@ -10,6 +10,8 @@
     <p:sldId id="258" r:id="rId4"/>
     <p:sldId id="259" r:id="rId5"/>
     <p:sldId id="260" r:id="rId6"/>
+    <p:sldId id="261" r:id="rId7"/>
+    <p:sldId id="262" r:id="rId8"/>
   </p:sldIdLst>
   <p:sldSz cx="12192000" cy="6858000"/>
   <p:notesSz cx="6858000" cy="9144000"/>
@@ -108,6 +110,11 @@
       </a:defRPr>
     </a:lvl9pPr>
   </p:defaultTextStyle>
+  <p:extLst>
+    <p:ext uri="{EFAFB233-063F-42B5-8137-9DF3F51BA10A}">
+      <p15:sldGuideLst xmlns:p15="http://schemas.microsoft.com/office/powerpoint/2012/main"/>
+    </p:ext>
+  </p:extLst>
 </p:presentation>
 </file>
 
@@ -2970,7 +2977,7 @@
       </p:grpSpPr>
       <p:pic>
         <p:nvPicPr>
-          <p:cNvPr id="4" name="Picture 3"/>
+          <p:cNvPr id="2" name="Picture 1"/>
           <p:cNvPicPr>
             <a:picLocks noChangeAspect="1"/>
           </p:cNvPicPr>
@@ -2978,13 +2985,13 @@
         </p:nvPicPr>
         <p:blipFill rotWithShape="1">
           <a:blip r:embed="rId2"/>
-          <a:srcRect t="11420" r="16910" b="5491"/>
+          <a:srcRect t="11347" r="17058" b="5710"/>
           <a:stretch/>
         </p:blipFill>
         <p:spPr>
           <a:xfrm>
             <a:off x="0" y="0"/>
-            <a:ext cx="12030075" cy="6763614"/>
+            <a:ext cx="12192000" cy="6854653"/>
           </a:xfrm>
           <a:prstGeom prst="rect">
             <a:avLst/>
@@ -3180,48 +3187,139 @@
           <a:chExt cx="0" cy="0"/>
         </a:xfrm>
       </p:grpSpPr>
-      <p:sp>
-        <p:nvSpPr>
-          <p:cNvPr id="2" name="Title 1"/>
-          <p:cNvSpPr>
-            <a:spLocks noGrp="1"/>
-          </p:cNvSpPr>
-          <p:nvPr>
-            <p:ph type="title"/>
-          </p:nvPr>
-        </p:nvSpPr>
-        <p:spPr/>
-        <p:txBody>
-          <a:bodyPr/>
-          <a:lstStyle/>
-          <a:p>
-            <a:endParaRPr lang="en-US"/>
-          </a:p>
-        </p:txBody>
-      </p:sp>
-      <p:sp>
-        <p:nvSpPr>
-          <p:cNvPr id="3" name="Content Placeholder 2"/>
-          <p:cNvSpPr>
-            <a:spLocks noGrp="1"/>
-          </p:cNvSpPr>
-          <p:nvPr>
-            <p:ph idx="1"/>
-          </p:nvPr>
-        </p:nvSpPr>
-        <p:spPr/>
-        <p:txBody>
-          <a:bodyPr/>
-          <a:lstStyle/>
-          <a:p>
-            <a:endParaRPr lang="en-US"/>
-          </a:p>
-        </p:txBody>
-      </p:sp>
+      <p:pic>
+        <p:nvPicPr>
+          <p:cNvPr id="4" name="Picture 3"/>
+          <p:cNvPicPr>
+            <a:picLocks noChangeAspect="1"/>
+          </p:cNvPicPr>
+          <p:nvPr/>
+        </p:nvPicPr>
+        <p:blipFill rotWithShape="1">
+          <a:blip r:embed="rId2"/>
+          <a:srcRect t="11344" r="17203" b="5860"/>
+          <a:stretch/>
+        </p:blipFill>
+        <p:spPr>
+          <a:xfrm>
+            <a:off x="0" y="0"/>
+            <a:ext cx="12197952" cy="6858000"/>
+          </a:xfrm>
+          <a:prstGeom prst="rect">
+            <a:avLst/>
+          </a:prstGeom>
+        </p:spPr>
+      </p:pic>
     </p:spTree>
     <p:extLst>
       <p:ext uri="{BB962C8B-B14F-4D97-AF65-F5344CB8AC3E}">
         <p14:creationId xmlns:p14="http://schemas.microsoft.com/office/powerpoint/2010/main" val="391174454"/>
+      </p:ext>
+    </p:extLst>
+  </p:cSld>
+  <p:clrMapOvr>
+    <a:masterClrMapping/>
+  </p:clrMapOvr>
+</p:sld>
+</file>
+
+<file path=ppt/slides/slide6.xml><?xml version="1.0" encoding="utf-8"?>
+<p:sld xmlns:a="http://schemas.openxmlformats.org/drawingml/2006/main" xmlns:r="http://schemas.openxmlformats.org/officeDocument/2006/relationships" xmlns:p="http://schemas.openxmlformats.org/presentationml/2006/main">
+  <p:cSld>
+    <p:spTree>
+      <p:nvGrpSpPr>
+        <p:cNvPr id="1" name=""/>
+        <p:cNvGrpSpPr/>
+        <p:nvPr/>
+      </p:nvGrpSpPr>
+      <p:grpSpPr>
+        <a:xfrm>
+          <a:off x="0" y="0"/>
+          <a:ext cx="0" cy="0"/>
+          <a:chOff x="0" y="0"/>
+          <a:chExt cx="0" cy="0"/>
+        </a:xfrm>
+      </p:grpSpPr>
+      <p:pic>
+        <p:nvPicPr>
+          <p:cNvPr id="4" name="Picture 3"/>
+          <p:cNvPicPr>
+            <a:picLocks noChangeAspect="1"/>
+          </p:cNvPicPr>
+          <p:nvPr/>
+        </p:nvPicPr>
+        <p:blipFill rotWithShape="1">
+          <a:blip r:embed="rId2"/>
+          <a:srcRect l="-1" t="11718" r="16617" b="4899"/>
+          <a:stretch/>
+        </p:blipFill>
+        <p:spPr>
+          <a:xfrm>
+            <a:off x="0" y="0"/>
+            <a:ext cx="12197953" cy="6858000"/>
+          </a:xfrm>
+          <a:prstGeom prst="rect">
+            <a:avLst/>
+          </a:prstGeom>
+        </p:spPr>
+      </p:pic>
+    </p:spTree>
+    <p:extLst>
+      <p:ext uri="{BB962C8B-B14F-4D97-AF65-F5344CB8AC3E}">
+        <p14:creationId xmlns:p14="http://schemas.microsoft.com/office/powerpoint/2010/main" val="2803120891"/>
+      </p:ext>
+    </p:extLst>
+  </p:cSld>
+  <p:clrMapOvr>
+    <a:masterClrMapping/>
+  </p:clrMapOvr>
+</p:sld>
+</file>
+
+<file path=ppt/slides/slide7.xml><?xml version="1.0" encoding="utf-8"?>
+<p:sld xmlns:a="http://schemas.openxmlformats.org/drawingml/2006/main" xmlns:r="http://schemas.openxmlformats.org/officeDocument/2006/relationships" xmlns:p="http://schemas.openxmlformats.org/presentationml/2006/main">
+  <p:cSld>
+    <p:spTree>
+      <p:nvGrpSpPr>
+        <p:cNvPr id="1" name=""/>
+        <p:cNvGrpSpPr/>
+        <p:nvPr/>
+      </p:nvGrpSpPr>
+      <p:grpSpPr>
+        <a:xfrm>
+          <a:off x="0" y="0"/>
+          <a:ext cx="0" cy="0"/>
+          <a:chOff x="0" y="0"/>
+          <a:chExt cx="0" cy="0"/>
+        </a:xfrm>
+      </p:grpSpPr>
+      <p:pic>
+        <p:nvPicPr>
+          <p:cNvPr id="4" name="Picture 3"/>
+          <p:cNvPicPr>
+            <a:picLocks noChangeAspect="1"/>
+          </p:cNvPicPr>
+          <p:nvPr/>
+        </p:nvPicPr>
+        <p:blipFill rotWithShape="1">
+          <a:blip r:embed="rId2"/>
+          <a:srcRect t="10908" r="16472" b="5564"/>
+          <a:stretch/>
+        </p:blipFill>
+        <p:spPr>
+          <a:xfrm>
+            <a:off x="0" y="0"/>
+            <a:ext cx="12197952" cy="6858000"/>
+          </a:xfrm>
+          <a:prstGeom prst="rect">
+            <a:avLst/>
+          </a:prstGeom>
+        </p:spPr>
+      </p:pic>
+    </p:spTree>
+    <p:extLst>
+      <p:ext uri="{BB962C8B-B14F-4D97-AF65-F5344CB8AC3E}">
+        <p14:creationId xmlns:p14="http://schemas.microsoft.com/office/powerpoint/2010/main" val="1379568419"/>
       </p:ext>
     </p:extLst>
   </p:cSld>

</xml_diff>